<commit_message>
neue version v. Eveline
</commit_message>
<xml_diff>
--- a/Präsentationen/Alpenwanderung als Motivationsstrategie.pptx
+++ b/Präsentationen/Alpenwanderung als Motivationsstrategie.pptx
@@ -9,8 +9,9 @@
     <p:sldId id="258" r:id="rId3"/>
     <p:sldId id="257" r:id="rId4"/>
     <p:sldId id="259" r:id="rId5"/>
-    <p:sldId id="260" r:id="rId6"/>
-    <p:sldId id="261" r:id="rId7"/>
+    <p:sldId id="261" r:id="rId6"/>
+    <p:sldId id="260" r:id="rId7"/>
+    <p:sldId id="262" r:id="rId8"/>
   </p:sldIdLst>
   <p:sldSz cx="12192000" cy="6858000"/>
   <p:notesSz cx="6858000" cy="9144000"/>
@@ -134,7 +135,7 @@
           <p:cNvPr id="2" name="Titel 1">
             <a:extLst>
               <a:ext uri="{FF2B5EF4-FFF2-40B4-BE49-F238E27FC236}">
-                <a16:creationId xmlns:a16="http://schemas.microsoft.com/office/drawing/2014/main" id="{03BEAC30-4F7E-4139-9C11-952D0BAF6AFF}"/>
+                <a16:creationId xmlns:a16="http://schemas.microsoft.com/office/drawing/2014/main" xmlns="" id="{03BEAC30-4F7E-4139-9C11-952D0BAF6AFF}"/>
               </a:ext>
             </a:extLst>
           </p:cNvPr>
@@ -171,7 +172,7 @@
           <p:cNvPr id="3" name="Untertitel 2">
             <a:extLst>
               <a:ext uri="{FF2B5EF4-FFF2-40B4-BE49-F238E27FC236}">
-                <a16:creationId xmlns:a16="http://schemas.microsoft.com/office/drawing/2014/main" id="{09ABDEBB-E478-48BD-865C-C532BE4FF141}"/>
+                <a16:creationId xmlns:a16="http://schemas.microsoft.com/office/drawing/2014/main" xmlns="" id="{09ABDEBB-E478-48BD-865C-C532BE4FF141}"/>
               </a:ext>
             </a:extLst>
           </p:cNvPr>
@@ -241,7 +242,7 @@
           <p:cNvPr id="4" name="Datumsplatzhalter 3">
             <a:extLst>
               <a:ext uri="{FF2B5EF4-FFF2-40B4-BE49-F238E27FC236}">
-                <a16:creationId xmlns:a16="http://schemas.microsoft.com/office/drawing/2014/main" id="{2BE3C160-1233-4647-9A86-E33CD1CF31AA}"/>
+                <a16:creationId xmlns:a16="http://schemas.microsoft.com/office/drawing/2014/main" xmlns="" id="{2BE3C160-1233-4647-9A86-E33CD1CF31AA}"/>
               </a:ext>
             </a:extLst>
           </p:cNvPr>
@@ -259,7 +260,7 @@
           <a:p>
             <a:fld id="{7B27B070-1BD4-4D45-95B4-47E5382BCA28}" type="datetimeFigureOut">
               <a:rPr lang="de-DE" smtClean="0"/>
-              <a:t>28.12.2017</a:t>
+              <a:t>05.01.2018</a:t>
             </a:fld>
             <a:endParaRPr lang="de-DE"/>
           </a:p>
@@ -270,7 +271,7 @@
           <p:cNvPr id="5" name="Fußzeilenplatzhalter 4">
             <a:extLst>
               <a:ext uri="{FF2B5EF4-FFF2-40B4-BE49-F238E27FC236}">
-                <a16:creationId xmlns:a16="http://schemas.microsoft.com/office/drawing/2014/main" id="{C4E569B1-69A9-40FF-B793-07EAFE67FD79}"/>
+                <a16:creationId xmlns:a16="http://schemas.microsoft.com/office/drawing/2014/main" xmlns="" id="{C4E569B1-69A9-40FF-B793-07EAFE67FD79}"/>
               </a:ext>
             </a:extLst>
           </p:cNvPr>
@@ -295,7 +296,7 @@
           <p:cNvPr id="6" name="Foliennummernplatzhalter 5">
             <a:extLst>
               <a:ext uri="{FF2B5EF4-FFF2-40B4-BE49-F238E27FC236}">
-                <a16:creationId xmlns:a16="http://schemas.microsoft.com/office/drawing/2014/main" id="{7240EF8F-6822-4770-B4E9-CA91DA85EBD9}"/>
+                <a16:creationId xmlns:a16="http://schemas.microsoft.com/office/drawing/2014/main" xmlns="" id="{7240EF8F-6822-4770-B4E9-CA91DA85EBD9}"/>
               </a:ext>
             </a:extLst>
           </p:cNvPr>
@@ -354,7 +355,7 @@
           <p:cNvPr id="2" name="Titel 1">
             <a:extLst>
               <a:ext uri="{FF2B5EF4-FFF2-40B4-BE49-F238E27FC236}">
-                <a16:creationId xmlns:a16="http://schemas.microsoft.com/office/drawing/2014/main" id="{8192F98F-C5D3-41E6-BAE5-D0ED6CF3CFF3}"/>
+                <a16:creationId xmlns:a16="http://schemas.microsoft.com/office/drawing/2014/main" xmlns="" id="{8192F98F-C5D3-41E6-BAE5-D0ED6CF3CFF3}"/>
               </a:ext>
             </a:extLst>
           </p:cNvPr>
@@ -382,7 +383,7 @@
           <p:cNvPr id="3" name="Vertikaler Textplatzhalter 2">
             <a:extLst>
               <a:ext uri="{FF2B5EF4-FFF2-40B4-BE49-F238E27FC236}">
-                <a16:creationId xmlns:a16="http://schemas.microsoft.com/office/drawing/2014/main" id="{AD131D01-A5BF-48E1-9BCE-9661382169F3}"/>
+                <a16:creationId xmlns:a16="http://schemas.microsoft.com/office/drawing/2014/main" xmlns="" id="{AD131D01-A5BF-48E1-9BCE-9661382169F3}"/>
               </a:ext>
             </a:extLst>
           </p:cNvPr>
@@ -439,7 +440,7 @@
           <p:cNvPr id="4" name="Datumsplatzhalter 3">
             <a:extLst>
               <a:ext uri="{FF2B5EF4-FFF2-40B4-BE49-F238E27FC236}">
-                <a16:creationId xmlns:a16="http://schemas.microsoft.com/office/drawing/2014/main" id="{B8C7CD55-7182-44CE-89E6-FD5CFD694898}"/>
+                <a16:creationId xmlns:a16="http://schemas.microsoft.com/office/drawing/2014/main" xmlns="" id="{B8C7CD55-7182-44CE-89E6-FD5CFD694898}"/>
               </a:ext>
             </a:extLst>
           </p:cNvPr>
@@ -457,7 +458,7 @@
           <a:p>
             <a:fld id="{7B27B070-1BD4-4D45-95B4-47E5382BCA28}" type="datetimeFigureOut">
               <a:rPr lang="de-DE" smtClean="0"/>
-              <a:t>28.12.2017</a:t>
+              <a:t>05.01.2018</a:t>
             </a:fld>
             <a:endParaRPr lang="de-DE"/>
           </a:p>
@@ -468,7 +469,7 @@
           <p:cNvPr id="5" name="Fußzeilenplatzhalter 4">
             <a:extLst>
               <a:ext uri="{FF2B5EF4-FFF2-40B4-BE49-F238E27FC236}">
-                <a16:creationId xmlns:a16="http://schemas.microsoft.com/office/drawing/2014/main" id="{E9E17B14-7B83-4117-9D59-246908EF2994}"/>
+                <a16:creationId xmlns:a16="http://schemas.microsoft.com/office/drawing/2014/main" xmlns="" id="{E9E17B14-7B83-4117-9D59-246908EF2994}"/>
               </a:ext>
             </a:extLst>
           </p:cNvPr>
@@ -493,7 +494,7 @@
           <p:cNvPr id="6" name="Foliennummernplatzhalter 5">
             <a:extLst>
               <a:ext uri="{FF2B5EF4-FFF2-40B4-BE49-F238E27FC236}">
-                <a16:creationId xmlns:a16="http://schemas.microsoft.com/office/drawing/2014/main" id="{16F2495D-118E-4086-B7E2-B0E1D9BAA560}"/>
+                <a16:creationId xmlns:a16="http://schemas.microsoft.com/office/drawing/2014/main" xmlns="" id="{16F2495D-118E-4086-B7E2-B0E1D9BAA560}"/>
               </a:ext>
             </a:extLst>
           </p:cNvPr>
@@ -552,7 +553,7 @@
           <p:cNvPr id="2" name="Vertikaler Titel 1">
             <a:extLst>
               <a:ext uri="{FF2B5EF4-FFF2-40B4-BE49-F238E27FC236}">
-                <a16:creationId xmlns:a16="http://schemas.microsoft.com/office/drawing/2014/main" id="{FE6360E3-AEE6-48E7-B8DF-382766790547}"/>
+                <a16:creationId xmlns:a16="http://schemas.microsoft.com/office/drawing/2014/main" xmlns="" id="{FE6360E3-AEE6-48E7-B8DF-382766790547}"/>
               </a:ext>
             </a:extLst>
           </p:cNvPr>
@@ -585,7 +586,7 @@
           <p:cNvPr id="3" name="Vertikaler Textplatzhalter 2">
             <a:extLst>
               <a:ext uri="{FF2B5EF4-FFF2-40B4-BE49-F238E27FC236}">
-                <a16:creationId xmlns:a16="http://schemas.microsoft.com/office/drawing/2014/main" id="{CBFD75E1-6F93-47C2-BDC6-D5D097EB3877}"/>
+                <a16:creationId xmlns:a16="http://schemas.microsoft.com/office/drawing/2014/main" xmlns="" id="{CBFD75E1-6F93-47C2-BDC6-D5D097EB3877}"/>
               </a:ext>
             </a:extLst>
           </p:cNvPr>
@@ -647,7 +648,7 @@
           <p:cNvPr id="4" name="Datumsplatzhalter 3">
             <a:extLst>
               <a:ext uri="{FF2B5EF4-FFF2-40B4-BE49-F238E27FC236}">
-                <a16:creationId xmlns:a16="http://schemas.microsoft.com/office/drawing/2014/main" id="{130FBF42-8878-46BF-9C95-162671872576}"/>
+                <a16:creationId xmlns:a16="http://schemas.microsoft.com/office/drawing/2014/main" xmlns="" id="{130FBF42-8878-46BF-9C95-162671872576}"/>
               </a:ext>
             </a:extLst>
           </p:cNvPr>
@@ -665,7 +666,7 @@
           <a:p>
             <a:fld id="{7B27B070-1BD4-4D45-95B4-47E5382BCA28}" type="datetimeFigureOut">
               <a:rPr lang="de-DE" smtClean="0"/>
-              <a:t>28.12.2017</a:t>
+              <a:t>05.01.2018</a:t>
             </a:fld>
             <a:endParaRPr lang="de-DE"/>
           </a:p>
@@ -676,7 +677,7 @@
           <p:cNvPr id="5" name="Fußzeilenplatzhalter 4">
             <a:extLst>
               <a:ext uri="{FF2B5EF4-FFF2-40B4-BE49-F238E27FC236}">
-                <a16:creationId xmlns:a16="http://schemas.microsoft.com/office/drawing/2014/main" id="{BDC64573-DBBF-4C97-8079-38FC4417B6D6}"/>
+                <a16:creationId xmlns:a16="http://schemas.microsoft.com/office/drawing/2014/main" xmlns="" id="{BDC64573-DBBF-4C97-8079-38FC4417B6D6}"/>
               </a:ext>
             </a:extLst>
           </p:cNvPr>
@@ -701,7 +702,7 @@
           <p:cNvPr id="6" name="Foliennummernplatzhalter 5">
             <a:extLst>
               <a:ext uri="{FF2B5EF4-FFF2-40B4-BE49-F238E27FC236}">
-                <a16:creationId xmlns:a16="http://schemas.microsoft.com/office/drawing/2014/main" id="{4D7CA9FC-2B8D-4717-A914-4C1D176A2402}"/>
+                <a16:creationId xmlns:a16="http://schemas.microsoft.com/office/drawing/2014/main" xmlns="" id="{4D7CA9FC-2B8D-4717-A914-4C1D176A2402}"/>
               </a:ext>
             </a:extLst>
           </p:cNvPr>
@@ -760,7 +761,7 @@
           <p:cNvPr id="2" name="Titel 1">
             <a:extLst>
               <a:ext uri="{FF2B5EF4-FFF2-40B4-BE49-F238E27FC236}">
-                <a16:creationId xmlns:a16="http://schemas.microsoft.com/office/drawing/2014/main" id="{227D4F24-1FA7-45FA-87A0-EF23BE3C070B}"/>
+                <a16:creationId xmlns:a16="http://schemas.microsoft.com/office/drawing/2014/main" xmlns="" id="{227D4F24-1FA7-45FA-87A0-EF23BE3C070B}"/>
               </a:ext>
             </a:extLst>
           </p:cNvPr>
@@ -788,7 +789,7 @@
           <p:cNvPr id="3" name="Inhaltsplatzhalter 2">
             <a:extLst>
               <a:ext uri="{FF2B5EF4-FFF2-40B4-BE49-F238E27FC236}">
-                <a16:creationId xmlns:a16="http://schemas.microsoft.com/office/drawing/2014/main" id="{E92896BB-C522-4F19-955B-DB528EC4DF18}"/>
+                <a16:creationId xmlns:a16="http://schemas.microsoft.com/office/drawing/2014/main" xmlns="" id="{E92896BB-C522-4F19-955B-DB528EC4DF18}"/>
               </a:ext>
             </a:extLst>
           </p:cNvPr>
@@ -845,7 +846,7 @@
           <p:cNvPr id="4" name="Datumsplatzhalter 3">
             <a:extLst>
               <a:ext uri="{FF2B5EF4-FFF2-40B4-BE49-F238E27FC236}">
-                <a16:creationId xmlns:a16="http://schemas.microsoft.com/office/drawing/2014/main" id="{7D2AACDC-BE2C-4EAF-9B07-3F09D2D02B14}"/>
+                <a16:creationId xmlns:a16="http://schemas.microsoft.com/office/drawing/2014/main" xmlns="" id="{7D2AACDC-BE2C-4EAF-9B07-3F09D2D02B14}"/>
               </a:ext>
             </a:extLst>
           </p:cNvPr>
@@ -863,7 +864,7 @@
           <a:p>
             <a:fld id="{7B27B070-1BD4-4D45-95B4-47E5382BCA28}" type="datetimeFigureOut">
               <a:rPr lang="de-DE" smtClean="0"/>
-              <a:t>28.12.2017</a:t>
+              <a:t>05.01.2018</a:t>
             </a:fld>
             <a:endParaRPr lang="de-DE"/>
           </a:p>
@@ -874,7 +875,7 @@
           <p:cNvPr id="5" name="Fußzeilenplatzhalter 4">
             <a:extLst>
               <a:ext uri="{FF2B5EF4-FFF2-40B4-BE49-F238E27FC236}">
-                <a16:creationId xmlns:a16="http://schemas.microsoft.com/office/drawing/2014/main" id="{85E63E6F-599B-4366-B2D7-2F83FDA35A12}"/>
+                <a16:creationId xmlns:a16="http://schemas.microsoft.com/office/drawing/2014/main" xmlns="" id="{85E63E6F-599B-4366-B2D7-2F83FDA35A12}"/>
               </a:ext>
             </a:extLst>
           </p:cNvPr>
@@ -899,7 +900,7 @@
           <p:cNvPr id="6" name="Foliennummernplatzhalter 5">
             <a:extLst>
               <a:ext uri="{FF2B5EF4-FFF2-40B4-BE49-F238E27FC236}">
-                <a16:creationId xmlns:a16="http://schemas.microsoft.com/office/drawing/2014/main" id="{E937111A-F0FA-4C09-ABEC-59D88387B4A4}"/>
+                <a16:creationId xmlns:a16="http://schemas.microsoft.com/office/drawing/2014/main" xmlns="" id="{E937111A-F0FA-4C09-ABEC-59D88387B4A4}"/>
               </a:ext>
             </a:extLst>
           </p:cNvPr>
@@ -958,7 +959,7 @@
           <p:cNvPr id="2" name="Titel 1">
             <a:extLst>
               <a:ext uri="{FF2B5EF4-FFF2-40B4-BE49-F238E27FC236}">
-                <a16:creationId xmlns:a16="http://schemas.microsoft.com/office/drawing/2014/main" id="{C0A4ED97-F214-411A-9C7B-86D6E1DC653E}"/>
+                <a16:creationId xmlns:a16="http://schemas.microsoft.com/office/drawing/2014/main" xmlns="" id="{C0A4ED97-F214-411A-9C7B-86D6E1DC653E}"/>
               </a:ext>
             </a:extLst>
           </p:cNvPr>
@@ -995,7 +996,7 @@
           <p:cNvPr id="3" name="Textplatzhalter 2">
             <a:extLst>
               <a:ext uri="{FF2B5EF4-FFF2-40B4-BE49-F238E27FC236}">
-                <a16:creationId xmlns:a16="http://schemas.microsoft.com/office/drawing/2014/main" id="{E351832B-5616-489A-A3C4-7AAF85C8386B}"/>
+                <a16:creationId xmlns:a16="http://schemas.microsoft.com/office/drawing/2014/main" xmlns="" id="{E351832B-5616-489A-A3C4-7AAF85C8386B}"/>
               </a:ext>
             </a:extLst>
           </p:cNvPr>
@@ -1120,7 +1121,7 @@
           <p:cNvPr id="4" name="Datumsplatzhalter 3">
             <a:extLst>
               <a:ext uri="{FF2B5EF4-FFF2-40B4-BE49-F238E27FC236}">
-                <a16:creationId xmlns:a16="http://schemas.microsoft.com/office/drawing/2014/main" id="{BABBA531-E1FC-4FBB-BD11-5428D97B15F8}"/>
+                <a16:creationId xmlns:a16="http://schemas.microsoft.com/office/drawing/2014/main" xmlns="" id="{BABBA531-E1FC-4FBB-BD11-5428D97B15F8}"/>
               </a:ext>
             </a:extLst>
           </p:cNvPr>
@@ -1138,7 +1139,7 @@
           <a:p>
             <a:fld id="{7B27B070-1BD4-4D45-95B4-47E5382BCA28}" type="datetimeFigureOut">
               <a:rPr lang="de-DE" smtClean="0"/>
-              <a:t>28.12.2017</a:t>
+              <a:t>05.01.2018</a:t>
             </a:fld>
             <a:endParaRPr lang="de-DE"/>
           </a:p>
@@ -1149,7 +1150,7 @@
           <p:cNvPr id="5" name="Fußzeilenplatzhalter 4">
             <a:extLst>
               <a:ext uri="{FF2B5EF4-FFF2-40B4-BE49-F238E27FC236}">
-                <a16:creationId xmlns:a16="http://schemas.microsoft.com/office/drawing/2014/main" id="{A4254A35-6642-4F30-8984-FCF6B7D0EC28}"/>
+                <a16:creationId xmlns:a16="http://schemas.microsoft.com/office/drawing/2014/main" xmlns="" id="{A4254A35-6642-4F30-8984-FCF6B7D0EC28}"/>
               </a:ext>
             </a:extLst>
           </p:cNvPr>
@@ -1174,7 +1175,7 @@
           <p:cNvPr id="6" name="Foliennummernplatzhalter 5">
             <a:extLst>
               <a:ext uri="{FF2B5EF4-FFF2-40B4-BE49-F238E27FC236}">
-                <a16:creationId xmlns:a16="http://schemas.microsoft.com/office/drawing/2014/main" id="{2797EB03-977B-4BBA-86E2-469EC2961DBC}"/>
+                <a16:creationId xmlns:a16="http://schemas.microsoft.com/office/drawing/2014/main" xmlns="" id="{2797EB03-977B-4BBA-86E2-469EC2961DBC}"/>
               </a:ext>
             </a:extLst>
           </p:cNvPr>
@@ -1233,7 +1234,7 @@
           <p:cNvPr id="2" name="Titel 1">
             <a:extLst>
               <a:ext uri="{FF2B5EF4-FFF2-40B4-BE49-F238E27FC236}">
-                <a16:creationId xmlns:a16="http://schemas.microsoft.com/office/drawing/2014/main" id="{8688F82F-FB1D-4956-8933-534E142BB0E0}"/>
+                <a16:creationId xmlns:a16="http://schemas.microsoft.com/office/drawing/2014/main" xmlns="" id="{8688F82F-FB1D-4956-8933-534E142BB0E0}"/>
               </a:ext>
             </a:extLst>
           </p:cNvPr>
@@ -1261,7 +1262,7 @@
           <p:cNvPr id="3" name="Inhaltsplatzhalter 2">
             <a:extLst>
               <a:ext uri="{FF2B5EF4-FFF2-40B4-BE49-F238E27FC236}">
-                <a16:creationId xmlns:a16="http://schemas.microsoft.com/office/drawing/2014/main" id="{BE366524-1214-4E13-926A-2F27D1F90FF9}"/>
+                <a16:creationId xmlns:a16="http://schemas.microsoft.com/office/drawing/2014/main" xmlns="" id="{BE366524-1214-4E13-926A-2F27D1F90FF9}"/>
               </a:ext>
             </a:extLst>
           </p:cNvPr>
@@ -1323,7 +1324,7 @@
           <p:cNvPr id="4" name="Inhaltsplatzhalter 3">
             <a:extLst>
               <a:ext uri="{FF2B5EF4-FFF2-40B4-BE49-F238E27FC236}">
-                <a16:creationId xmlns:a16="http://schemas.microsoft.com/office/drawing/2014/main" id="{03CACC98-C676-4230-90F4-00B92E0BE526}"/>
+                <a16:creationId xmlns:a16="http://schemas.microsoft.com/office/drawing/2014/main" xmlns="" id="{03CACC98-C676-4230-90F4-00B92E0BE526}"/>
               </a:ext>
             </a:extLst>
           </p:cNvPr>
@@ -1385,7 +1386,7 @@
           <p:cNvPr id="5" name="Datumsplatzhalter 4">
             <a:extLst>
               <a:ext uri="{FF2B5EF4-FFF2-40B4-BE49-F238E27FC236}">
-                <a16:creationId xmlns:a16="http://schemas.microsoft.com/office/drawing/2014/main" id="{037A486D-59D0-4309-B408-0A400FA9983D}"/>
+                <a16:creationId xmlns:a16="http://schemas.microsoft.com/office/drawing/2014/main" xmlns="" id="{037A486D-59D0-4309-B408-0A400FA9983D}"/>
               </a:ext>
             </a:extLst>
           </p:cNvPr>
@@ -1403,7 +1404,7 @@
           <a:p>
             <a:fld id="{7B27B070-1BD4-4D45-95B4-47E5382BCA28}" type="datetimeFigureOut">
               <a:rPr lang="de-DE" smtClean="0"/>
-              <a:t>28.12.2017</a:t>
+              <a:t>05.01.2018</a:t>
             </a:fld>
             <a:endParaRPr lang="de-DE"/>
           </a:p>
@@ -1414,7 +1415,7 @@
           <p:cNvPr id="6" name="Fußzeilenplatzhalter 5">
             <a:extLst>
               <a:ext uri="{FF2B5EF4-FFF2-40B4-BE49-F238E27FC236}">
-                <a16:creationId xmlns:a16="http://schemas.microsoft.com/office/drawing/2014/main" id="{9587BC51-7EA0-401E-AA67-EFCFD0673528}"/>
+                <a16:creationId xmlns:a16="http://schemas.microsoft.com/office/drawing/2014/main" xmlns="" id="{9587BC51-7EA0-401E-AA67-EFCFD0673528}"/>
               </a:ext>
             </a:extLst>
           </p:cNvPr>
@@ -1439,7 +1440,7 @@
           <p:cNvPr id="7" name="Foliennummernplatzhalter 6">
             <a:extLst>
               <a:ext uri="{FF2B5EF4-FFF2-40B4-BE49-F238E27FC236}">
-                <a16:creationId xmlns:a16="http://schemas.microsoft.com/office/drawing/2014/main" id="{AC72C1BF-405C-4D05-8BDD-96CFB799F328}"/>
+                <a16:creationId xmlns:a16="http://schemas.microsoft.com/office/drawing/2014/main" xmlns="" id="{AC72C1BF-405C-4D05-8BDD-96CFB799F328}"/>
               </a:ext>
             </a:extLst>
           </p:cNvPr>
@@ -1498,7 +1499,7 @@
           <p:cNvPr id="2" name="Titel 1">
             <a:extLst>
               <a:ext uri="{FF2B5EF4-FFF2-40B4-BE49-F238E27FC236}">
-                <a16:creationId xmlns:a16="http://schemas.microsoft.com/office/drawing/2014/main" id="{A78C9328-1BD5-4F59-BD58-67B38066E0A2}"/>
+                <a16:creationId xmlns:a16="http://schemas.microsoft.com/office/drawing/2014/main" xmlns="" id="{A78C9328-1BD5-4F59-BD58-67B38066E0A2}"/>
               </a:ext>
             </a:extLst>
           </p:cNvPr>
@@ -1531,7 +1532,7 @@
           <p:cNvPr id="3" name="Textplatzhalter 2">
             <a:extLst>
               <a:ext uri="{FF2B5EF4-FFF2-40B4-BE49-F238E27FC236}">
-                <a16:creationId xmlns:a16="http://schemas.microsoft.com/office/drawing/2014/main" id="{18BF547B-E407-4B75-9799-8FCFDC0B0D35}"/>
+                <a16:creationId xmlns:a16="http://schemas.microsoft.com/office/drawing/2014/main" xmlns="" id="{18BF547B-E407-4B75-9799-8FCFDC0B0D35}"/>
               </a:ext>
             </a:extLst>
           </p:cNvPr>
@@ -1602,7 +1603,7 @@
           <p:cNvPr id="4" name="Inhaltsplatzhalter 3">
             <a:extLst>
               <a:ext uri="{FF2B5EF4-FFF2-40B4-BE49-F238E27FC236}">
-                <a16:creationId xmlns:a16="http://schemas.microsoft.com/office/drawing/2014/main" id="{5F723D2B-8C30-450F-837D-6D0436BCEF29}"/>
+                <a16:creationId xmlns:a16="http://schemas.microsoft.com/office/drawing/2014/main" xmlns="" id="{5F723D2B-8C30-450F-837D-6D0436BCEF29}"/>
               </a:ext>
             </a:extLst>
           </p:cNvPr>
@@ -1664,7 +1665,7 @@
           <p:cNvPr id="5" name="Textplatzhalter 4">
             <a:extLst>
               <a:ext uri="{FF2B5EF4-FFF2-40B4-BE49-F238E27FC236}">
-                <a16:creationId xmlns:a16="http://schemas.microsoft.com/office/drawing/2014/main" id="{9B3A8BC5-99EB-48CE-8C90-E8019274BD03}"/>
+                <a16:creationId xmlns:a16="http://schemas.microsoft.com/office/drawing/2014/main" xmlns="" id="{9B3A8BC5-99EB-48CE-8C90-E8019274BD03}"/>
               </a:ext>
             </a:extLst>
           </p:cNvPr>
@@ -1735,7 +1736,7 @@
           <p:cNvPr id="6" name="Inhaltsplatzhalter 5">
             <a:extLst>
               <a:ext uri="{FF2B5EF4-FFF2-40B4-BE49-F238E27FC236}">
-                <a16:creationId xmlns:a16="http://schemas.microsoft.com/office/drawing/2014/main" id="{A80C77B6-F35F-48CD-AD12-216E4552BD72}"/>
+                <a16:creationId xmlns:a16="http://schemas.microsoft.com/office/drawing/2014/main" xmlns="" id="{A80C77B6-F35F-48CD-AD12-216E4552BD72}"/>
               </a:ext>
             </a:extLst>
           </p:cNvPr>
@@ -1797,7 +1798,7 @@
           <p:cNvPr id="7" name="Datumsplatzhalter 6">
             <a:extLst>
               <a:ext uri="{FF2B5EF4-FFF2-40B4-BE49-F238E27FC236}">
-                <a16:creationId xmlns:a16="http://schemas.microsoft.com/office/drawing/2014/main" id="{A526E7A3-0912-448D-B695-5FA35DF40422}"/>
+                <a16:creationId xmlns:a16="http://schemas.microsoft.com/office/drawing/2014/main" xmlns="" id="{A526E7A3-0912-448D-B695-5FA35DF40422}"/>
               </a:ext>
             </a:extLst>
           </p:cNvPr>
@@ -1815,7 +1816,7 @@
           <a:p>
             <a:fld id="{7B27B070-1BD4-4D45-95B4-47E5382BCA28}" type="datetimeFigureOut">
               <a:rPr lang="de-DE" smtClean="0"/>
-              <a:t>28.12.2017</a:t>
+              <a:t>05.01.2018</a:t>
             </a:fld>
             <a:endParaRPr lang="de-DE"/>
           </a:p>
@@ -1826,7 +1827,7 @@
           <p:cNvPr id="8" name="Fußzeilenplatzhalter 7">
             <a:extLst>
               <a:ext uri="{FF2B5EF4-FFF2-40B4-BE49-F238E27FC236}">
-                <a16:creationId xmlns:a16="http://schemas.microsoft.com/office/drawing/2014/main" id="{C3CD80CB-262C-45EC-82E3-4786613BC6ED}"/>
+                <a16:creationId xmlns:a16="http://schemas.microsoft.com/office/drawing/2014/main" xmlns="" id="{C3CD80CB-262C-45EC-82E3-4786613BC6ED}"/>
               </a:ext>
             </a:extLst>
           </p:cNvPr>
@@ -1851,7 +1852,7 @@
           <p:cNvPr id="9" name="Foliennummernplatzhalter 8">
             <a:extLst>
               <a:ext uri="{FF2B5EF4-FFF2-40B4-BE49-F238E27FC236}">
-                <a16:creationId xmlns:a16="http://schemas.microsoft.com/office/drawing/2014/main" id="{C1DE198F-AAF1-4B1F-BB55-1F30871C06F9}"/>
+                <a16:creationId xmlns:a16="http://schemas.microsoft.com/office/drawing/2014/main" xmlns="" id="{C1DE198F-AAF1-4B1F-BB55-1F30871C06F9}"/>
               </a:ext>
             </a:extLst>
           </p:cNvPr>
@@ -1910,7 +1911,7 @@
           <p:cNvPr id="2" name="Titel 1">
             <a:extLst>
               <a:ext uri="{FF2B5EF4-FFF2-40B4-BE49-F238E27FC236}">
-                <a16:creationId xmlns:a16="http://schemas.microsoft.com/office/drawing/2014/main" id="{B69E5966-8975-4600-81D4-AE140EA75B3B}"/>
+                <a16:creationId xmlns:a16="http://schemas.microsoft.com/office/drawing/2014/main" xmlns="" id="{B69E5966-8975-4600-81D4-AE140EA75B3B}"/>
               </a:ext>
             </a:extLst>
           </p:cNvPr>
@@ -1938,7 +1939,7 @@
           <p:cNvPr id="3" name="Datumsplatzhalter 2">
             <a:extLst>
               <a:ext uri="{FF2B5EF4-FFF2-40B4-BE49-F238E27FC236}">
-                <a16:creationId xmlns:a16="http://schemas.microsoft.com/office/drawing/2014/main" id="{9B18E3B2-AC0D-4068-8DEA-86E3B370D073}"/>
+                <a16:creationId xmlns:a16="http://schemas.microsoft.com/office/drawing/2014/main" xmlns="" id="{9B18E3B2-AC0D-4068-8DEA-86E3B370D073}"/>
               </a:ext>
             </a:extLst>
           </p:cNvPr>
@@ -1956,7 +1957,7 @@
           <a:p>
             <a:fld id="{7B27B070-1BD4-4D45-95B4-47E5382BCA28}" type="datetimeFigureOut">
               <a:rPr lang="de-DE" smtClean="0"/>
-              <a:t>28.12.2017</a:t>
+              <a:t>05.01.2018</a:t>
             </a:fld>
             <a:endParaRPr lang="de-DE"/>
           </a:p>
@@ -1967,7 +1968,7 @@
           <p:cNvPr id="4" name="Fußzeilenplatzhalter 3">
             <a:extLst>
               <a:ext uri="{FF2B5EF4-FFF2-40B4-BE49-F238E27FC236}">
-                <a16:creationId xmlns:a16="http://schemas.microsoft.com/office/drawing/2014/main" id="{BF1D4E72-F99A-4797-B823-060B8E8677CA}"/>
+                <a16:creationId xmlns:a16="http://schemas.microsoft.com/office/drawing/2014/main" xmlns="" id="{BF1D4E72-F99A-4797-B823-060B8E8677CA}"/>
               </a:ext>
             </a:extLst>
           </p:cNvPr>
@@ -1992,7 +1993,7 @@
           <p:cNvPr id="5" name="Foliennummernplatzhalter 4">
             <a:extLst>
               <a:ext uri="{FF2B5EF4-FFF2-40B4-BE49-F238E27FC236}">
-                <a16:creationId xmlns:a16="http://schemas.microsoft.com/office/drawing/2014/main" id="{F8C0A4EE-539E-4D7A-8BC8-D608128005D5}"/>
+                <a16:creationId xmlns:a16="http://schemas.microsoft.com/office/drawing/2014/main" xmlns="" id="{F8C0A4EE-539E-4D7A-8BC8-D608128005D5}"/>
               </a:ext>
             </a:extLst>
           </p:cNvPr>
@@ -2051,7 +2052,7 @@
           <p:cNvPr id="2" name="Datumsplatzhalter 1">
             <a:extLst>
               <a:ext uri="{FF2B5EF4-FFF2-40B4-BE49-F238E27FC236}">
-                <a16:creationId xmlns:a16="http://schemas.microsoft.com/office/drawing/2014/main" id="{944FC57B-3204-4CB8-8255-55C79D3802E4}"/>
+                <a16:creationId xmlns:a16="http://schemas.microsoft.com/office/drawing/2014/main" xmlns="" id="{944FC57B-3204-4CB8-8255-55C79D3802E4}"/>
               </a:ext>
             </a:extLst>
           </p:cNvPr>
@@ -2069,7 +2070,7 @@
           <a:p>
             <a:fld id="{7B27B070-1BD4-4D45-95B4-47E5382BCA28}" type="datetimeFigureOut">
               <a:rPr lang="de-DE" smtClean="0"/>
-              <a:t>28.12.2017</a:t>
+              <a:t>05.01.2018</a:t>
             </a:fld>
             <a:endParaRPr lang="de-DE"/>
           </a:p>
@@ -2080,7 +2081,7 @@
           <p:cNvPr id="3" name="Fußzeilenplatzhalter 2">
             <a:extLst>
               <a:ext uri="{FF2B5EF4-FFF2-40B4-BE49-F238E27FC236}">
-                <a16:creationId xmlns:a16="http://schemas.microsoft.com/office/drawing/2014/main" id="{621555D1-AA5D-4E79-AB46-FD6FE74B8122}"/>
+                <a16:creationId xmlns:a16="http://schemas.microsoft.com/office/drawing/2014/main" xmlns="" id="{621555D1-AA5D-4E79-AB46-FD6FE74B8122}"/>
               </a:ext>
             </a:extLst>
           </p:cNvPr>
@@ -2105,7 +2106,7 @@
           <p:cNvPr id="4" name="Foliennummernplatzhalter 3">
             <a:extLst>
               <a:ext uri="{FF2B5EF4-FFF2-40B4-BE49-F238E27FC236}">
-                <a16:creationId xmlns:a16="http://schemas.microsoft.com/office/drawing/2014/main" id="{958FC899-F69F-4D37-B27B-CC846643ACD0}"/>
+                <a16:creationId xmlns:a16="http://schemas.microsoft.com/office/drawing/2014/main" xmlns="" id="{958FC899-F69F-4D37-B27B-CC846643ACD0}"/>
               </a:ext>
             </a:extLst>
           </p:cNvPr>
@@ -2164,7 +2165,7 @@
           <p:cNvPr id="2" name="Titel 1">
             <a:extLst>
               <a:ext uri="{FF2B5EF4-FFF2-40B4-BE49-F238E27FC236}">
-                <a16:creationId xmlns:a16="http://schemas.microsoft.com/office/drawing/2014/main" id="{1752DA42-08FC-4ECE-B45E-71C6E5EA4A80}"/>
+                <a16:creationId xmlns:a16="http://schemas.microsoft.com/office/drawing/2014/main" xmlns="" id="{1752DA42-08FC-4ECE-B45E-71C6E5EA4A80}"/>
               </a:ext>
             </a:extLst>
           </p:cNvPr>
@@ -2201,7 +2202,7 @@
           <p:cNvPr id="3" name="Inhaltsplatzhalter 2">
             <a:extLst>
               <a:ext uri="{FF2B5EF4-FFF2-40B4-BE49-F238E27FC236}">
-                <a16:creationId xmlns:a16="http://schemas.microsoft.com/office/drawing/2014/main" id="{751B0306-34EF-4B0F-A59A-A03156691D73}"/>
+                <a16:creationId xmlns:a16="http://schemas.microsoft.com/office/drawing/2014/main" xmlns="" id="{751B0306-34EF-4B0F-A59A-A03156691D73}"/>
               </a:ext>
             </a:extLst>
           </p:cNvPr>
@@ -2291,7 +2292,7 @@
           <p:cNvPr id="4" name="Textplatzhalter 3">
             <a:extLst>
               <a:ext uri="{FF2B5EF4-FFF2-40B4-BE49-F238E27FC236}">
-                <a16:creationId xmlns:a16="http://schemas.microsoft.com/office/drawing/2014/main" id="{1170DD66-290D-4915-A58B-D331F8FA4E5A}"/>
+                <a16:creationId xmlns:a16="http://schemas.microsoft.com/office/drawing/2014/main" xmlns="" id="{1170DD66-290D-4915-A58B-D331F8FA4E5A}"/>
               </a:ext>
             </a:extLst>
           </p:cNvPr>
@@ -2362,7 +2363,7 @@
           <p:cNvPr id="5" name="Datumsplatzhalter 4">
             <a:extLst>
               <a:ext uri="{FF2B5EF4-FFF2-40B4-BE49-F238E27FC236}">
-                <a16:creationId xmlns:a16="http://schemas.microsoft.com/office/drawing/2014/main" id="{28600C89-FA1C-4708-BA21-28564CCE9900}"/>
+                <a16:creationId xmlns:a16="http://schemas.microsoft.com/office/drawing/2014/main" xmlns="" id="{28600C89-FA1C-4708-BA21-28564CCE9900}"/>
               </a:ext>
             </a:extLst>
           </p:cNvPr>
@@ -2380,7 +2381,7 @@
           <a:p>
             <a:fld id="{7B27B070-1BD4-4D45-95B4-47E5382BCA28}" type="datetimeFigureOut">
               <a:rPr lang="de-DE" smtClean="0"/>
-              <a:t>28.12.2017</a:t>
+              <a:t>05.01.2018</a:t>
             </a:fld>
             <a:endParaRPr lang="de-DE"/>
           </a:p>
@@ -2391,7 +2392,7 @@
           <p:cNvPr id="6" name="Fußzeilenplatzhalter 5">
             <a:extLst>
               <a:ext uri="{FF2B5EF4-FFF2-40B4-BE49-F238E27FC236}">
-                <a16:creationId xmlns:a16="http://schemas.microsoft.com/office/drawing/2014/main" id="{E2D2A459-63DE-441F-83BE-13286FB4E88C}"/>
+                <a16:creationId xmlns:a16="http://schemas.microsoft.com/office/drawing/2014/main" xmlns="" id="{E2D2A459-63DE-441F-83BE-13286FB4E88C}"/>
               </a:ext>
             </a:extLst>
           </p:cNvPr>
@@ -2416,7 +2417,7 @@
           <p:cNvPr id="7" name="Foliennummernplatzhalter 6">
             <a:extLst>
               <a:ext uri="{FF2B5EF4-FFF2-40B4-BE49-F238E27FC236}">
-                <a16:creationId xmlns:a16="http://schemas.microsoft.com/office/drawing/2014/main" id="{972B34DC-B228-4577-9651-387C6CF4262F}"/>
+                <a16:creationId xmlns:a16="http://schemas.microsoft.com/office/drawing/2014/main" xmlns="" id="{972B34DC-B228-4577-9651-387C6CF4262F}"/>
               </a:ext>
             </a:extLst>
           </p:cNvPr>
@@ -2475,7 +2476,7 @@
           <p:cNvPr id="2" name="Titel 1">
             <a:extLst>
               <a:ext uri="{FF2B5EF4-FFF2-40B4-BE49-F238E27FC236}">
-                <a16:creationId xmlns:a16="http://schemas.microsoft.com/office/drawing/2014/main" id="{08F80924-EC43-48F2-968D-32A3ED8AD885}"/>
+                <a16:creationId xmlns:a16="http://schemas.microsoft.com/office/drawing/2014/main" xmlns="" id="{08F80924-EC43-48F2-968D-32A3ED8AD885}"/>
               </a:ext>
             </a:extLst>
           </p:cNvPr>
@@ -2512,7 +2513,7 @@
           <p:cNvPr id="3" name="Bildplatzhalter 2">
             <a:extLst>
               <a:ext uri="{FF2B5EF4-FFF2-40B4-BE49-F238E27FC236}">
-                <a16:creationId xmlns:a16="http://schemas.microsoft.com/office/drawing/2014/main" id="{FE3E0CE8-833A-46A9-93CF-3578EA087D8A}"/>
+                <a16:creationId xmlns:a16="http://schemas.microsoft.com/office/drawing/2014/main" xmlns="" id="{FE3E0CE8-833A-46A9-93CF-3578EA087D8A}"/>
               </a:ext>
             </a:extLst>
           </p:cNvPr>
@@ -2579,7 +2580,7 @@
           <p:cNvPr id="4" name="Textplatzhalter 3">
             <a:extLst>
               <a:ext uri="{FF2B5EF4-FFF2-40B4-BE49-F238E27FC236}">
-                <a16:creationId xmlns:a16="http://schemas.microsoft.com/office/drawing/2014/main" id="{C2A42EEC-4C1B-48B3-ACBD-7F22B397ABD5}"/>
+                <a16:creationId xmlns:a16="http://schemas.microsoft.com/office/drawing/2014/main" xmlns="" id="{C2A42EEC-4C1B-48B3-ACBD-7F22B397ABD5}"/>
               </a:ext>
             </a:extLst>
           </p:cNvPr>
@@ -2650,7 +2651,7 @@
           <p:cNvPr id="5" name="Datumsplatzhalter 4">
             <a:extLst>
               <a:ext uri="{FF2B5EF4-FFF2-40B4-BE49-F238E27FC236}">
-                <a16:creationId xmlns:a16="http://schemas.microsoft.com/office/drawing/2014/main" id="{995D60A6-F9C9-40FF-A06A-7899E8549BD1}"/>
+                <a16:creationId xmlns:a16="http://schemas.microsoft.com/office/drawing/2014/main" xmlns="" id="{995D60A6-F9C9-40FF-A06A-7899E8549BD1}"/>
               </a:ext>
             </a:extLst>
           </p:cNvPr>
@@ -2668,7 +2669,7 @@
           <a:p>
             <a:fld id="{7B27B070-1BD4-4D45-95B4-47E5382BCA28}" type="datetimeFigureOut">
               <a:rPr lang="de-DE" smtClean="0"/>
-              <a:t>28.12.2017</a:t>
+              <a:t>05.01.2018</a:t>
             </a:fld>
             <a:endParaRPr lang="de-DE"/>
           </a:p>
@@ -2679,7 +2680,7 @@
           <p:cNvPr id="6" name="Fußzeilenplatzhalter 5">
             <a:extLst>
               <a:ext uri="{FF2B5EF4-FFF2-40B4-BE49-F238E27FC236}">
-                <a16:creationId xmlns:a16="http://schemas.microsoft.com/office/drawing/2014/main" id="{33ED7F41-58B0-4A5E-A222-8D503C790E6A}"/>
+                <a16:creationId xmlns:a16="http://schemas.microsoft.com/office/drawing/2014/main" xmlns="" id="{33ED7F41-58B0-4A5E-A222-8D503C790E6A}"/>
               </a:ext>
             </a:extLst>
           </p:cNvPr>
@@ -2704,7 +2705,7 @@
           <p:cNvPr id="7" name="Foliennummernplatzhalter 6">
             <a:extLst>
               <a:ext uri="{FF2B5EF4-FFF2-40B4-BE49-F238E27FC236}">
-                <a16:creationId xmlns:a16="http://schemas.microsoft.com/office/drawing/2014/main" id="{D027A662-6A6F-4C1F-AB64-F3580CBC3C18}"/>
+                <a16:creationId xmlns:a16="http://schemas.microsoft.com/office/drawing/2014/main" xmlns="" id="{D027A662-6A6F-4C1F-AB64-F3580CBC3C18}"/>
               </a:ext>
             </a:extLst>
           </p:cNvPr>
@@ -2768,7 +2769,7 @@
           <p:cNvPr id="2" name="Titelplatzhalter 1">
             <a:extLst>
               <a:ext uri="{FF2B5EF4-FFF2-40B4-BE49-F238E27FC236}">
-                <a16:creationId xmlns:a16="http://schemas.microsoft.com/office/drawing/2014/main" id="{570281B6-58ED-46D7-A42C-30A111495F0C}"/>
+                <a16:creationId xmlns:a16="http://schemas.microsoft.com/office/drawing/2014/main" xmlns="" id="{570281B6-58ED-46D7-A42C-30A111495F0C}"/>
               </a:ext>
             </a:extLst>
           </p:cNvPr>
@@ -2806,7 +2807,7 @@
           <p:cNvPr id="3" name="Textplatzhalter 2">
             <a:extLst>
               <a:ext uri="{FF2B5EF4-FFF2-40B4-BE49-F238E27FC236}">
-                <a16:creationId xmlns:a16="http://schemas.microsoft.com/office/drawing/2014/main" id="{3CA6EB7E-D29B-4D1A-9772-125A2F7D8941}"/>
+                <a16:creationId xmlns:a16="http://schemas.microsoft.com/office/drawing/2014/main" xmlns="" id="{3CA6EB7E-D29B-4D1A-9772-125A2F7D8941}"/>
               </a:ext>
             </a:extLst>
           </p:cNvPr>
@@ -2873,7 +2874,7 @@
           <p:cNvPr id="4" name="Datumsplatzhalter 3">
             <a:extLst>
               <a:ext uri="{FF2B5EF4-FFF2-40B4-BE49-F238E27FC236}">
-                <a16:creationId xmlns:a16="http://schemas.microsoft.com/office/drawing/2014/main" id="{1BB0B84B-8A41-42FF-9002-FADE61338803}"/>
+                <a16:creationId xmlns:a16="http://schemas.microsoft.com/office/drawing/2014/main" xmlns="" id="{1BB0B84B-8A41-42FF-9002-FADE61338803}"/>
               </a:ext>
             </a:extLst>
           </p:cNvPr>
@@ -2909,7 +2910,7 @@
           <a:p>
             <a:fld id="{7B27B070-1BD4-4D45-95B4-47E5382BCA28}" type="datetimeFigureOut">
               <a:rPr lang="de-DE" smtClean="0"/>
-              <a:t>28.12.2017</a:t>
+              <a:t>05.01.2018</a:t>
             </a:fld>
             <a:endParaRPr lang="de-DE"/>
           </a:p>
@@ -2920,7 +2921,7 @@
           <p:cNvPr id="5" name="Fußzeilenplatzhalter 4">
             <a:extLst>
               <a:ext uri="{FF2B5EF4-FFF2-40B4-BE49-F238E27FC236}">
-                <a16:creationId xmlns:a16="http://schemas.microsoft.com/office/drawing/2014/main" id="{8A4A187A-F4F3-449C-8424-0A0A0566C690}"/>
+                <a16:creationId xmlns:a16="http://schemas.microsoft.com/office/drawing/2014/main" xmlns="" id="{8A4A187A-F4F3-449C-8424-0A0A0566C690}"/>
               </a:ext>
             </a:extLst>
           </p:cNvPr>
@@ -2963,7 +2964,7 @@
           <p:cNvPr id="6" name="Foliennummernplatzhalter 5">
             <a:extLst>
               <a:ext uri="{FF2B5EF4-FFF2-40B4-BE49-F238E27FC236}">
-                <a16:creationId xmlns:a16="http://schemas.microsoft.com/office/drawing/2014/main" id="{AF00E726-E02D-4C50-BD15-2A4C039EC373}"/>
+                <a16:creationId xmlns:a16="http://schemas.microsoft.com/office/drawing/2014/main" xmlns="" id="{AF00E726-E02D-4C50-BD15-2A4C039EC373}"/>
               </a:ext>
             </a:extLst>
           </p:cNvPr>
@@ -3331,7 +3332,7 @@
           <p:cNvPr id="2" name="Titel 1">
             <a:extLst>
               <a:ext uri="{FF2B5EF4-FFF2-40B4-BE49-F238E27FC236}">
-                <a16:creationId xmlns:a16="http://schemas.microsoft.com/office/drawing/2014/main" id="{2BA7399F-9B7C-48C5-87FF-797084E9D740}"/>
+                <a16:creationId xmlns:a16="http://schemas.microsoft.com/office/drawing/2014/main" xmlns="" id="{2BA7399F-9B7C-48C5-87FF-797084E9D740}"/>
               </a:ext>
             </a:extLst>
           </p:cNvPr>
@@ -3359,7 +3360,7 @@
           <p:cNvPr id="3" name="Untertitel 2">
             <a:extLst>
               <a:ext uri="{FF2B5EF4-FFF2-40B4-BE49-F238E27FC236}">
-                <a16:creationId xmlns:a16="http://schemas.microsoft.com/office/drawing/2014/main" id="{771147AD-A69E-4143-B831-5E4AB941E7CA}"/>
+                <a16:creationId xmlns:a16="http://schemas.microsoft.com/office/drawing/2014/main" xmlns="" id="{771147AD-A69E-4143-B831-5E4AB941E7CA}"/>
               </a:ext>
             </a:extLst>
           </p:cNvPr>
@@ -3430,7 +3431,7 @@
           <p:cNvPr id="2" name="Titel 1">
             <a:extLst>
               <a:ext uri="{FF2B5EF4-FFF2-40B4-BE49-F238E27FC236}">
-                <a16:creationId xmlns:a16="http://schemas.microsoft.com/office/drawing/2014/main" id="{9C1CE729-AB0B-449E-A6E4-C00A02CC99C1}"/>
+                <a16:creationId xmlns:a16="http://schemas.microsoft.com/office/drawing/2014/main" xmlns="" id="{9C1CE729-AB0B-449E-A6E4-C00A02CC99C1}"/>
               </a:ext>
             </a:extLst>
           </p:cNvPr>
@@ -3458,7 +3459,7 @@
           <p:cNvPr id="3" name="Inhaltsplatzhalter 2">
             <a:extLst>
               <a:ext uri="{FF2B5EF4-FFF2-40B4-BE49-F238E27FC236}">
-                <a16:creationId xmlns:a16="http://schemas.microsoft.com/office/drawing/2014/main" id="{F2DC99B8-3F6F-47C4-81E6-C844FC2DE60A}"/>
+                <a16:creationId xmlns:a16="http://schemas.microsoft.com/office/drawing/2014/main" xmlns="" id="{F2DC99B8-3F6F-47C4-81E6-C844FC2DE60A}"/>
               </a:ext>
             </a:extLst>
           </p:cNvPr>
@@ -3533,7 +3534,7 @@
           <p:cNvPr id="4" name="Pfeil: Chevron 3">
             <a:extLst>
               <a:ext uri="{FF2B5EF4-FFF2-40B4-BE49-F238E27FC236}">
-                <a16:creationId xmlns:a16="http://schemas.microsoft.com/office/drawing/2014/main" id="{30C7E3A0-33CF-41D5-BBF1-6725A446A686}"/>
+                <a16:creationId xmlns:a16="http://schemas.microsoft.com/office/drawing/2014/main" xmlns="" id="{30C7E3A0-33CF-41D5-BBF1-6725A446A686}"/>
               </a:ext>
             </a:extLst>
           </p:cNvPr>
@@ -3613,7 +3614,7 @@
           <p:cNvPr id="2" name="Titel 1">
             <a:extLst>
               <a:ext uri="{FF2B5EF4-FFF2-40B4-BE49-F238E27FC236}">
-                <a16:creationId xmlns:a16="http://schemas.microsoft.com/office/drawing/2014/main" id="{4EDCBC4D-0EB7-4F12-A04A-5D18EE95E7DE}"/>
+                <a16:creationId xmlns:a16="http://schemas.microsoft.com/office/drawing/2014/main" xmlns="" id="{4EDCBC4D-0EB7-4F12-A04A-5D18EE95E7DE}"/>
               </a:ext>
             </a:extLst>
           </p:cNvPr>
@@ -3641,7 +3642,7 @@
           <p:cNvPr id="3" name="Inhaltsplatzhalter 2">
             <a:extLst>
               <a:ext uri="{FF2B5EF4-FFF2-40B4-BE49-F238E27FC236}">
-                <a16:creationId xmlns:a16="http://schemas.microsoft.com/office/drawing/2014/main" id="{3321F122-CC8F-490B-BBED-67BBD7C26D9D}"/>
+                <a16:creationId xmlns:a16="http://schemas.microsoft.com/office/drawing/2014/main" xmlns="" id="{3321F122-CC8F-490B-BBED-67BBD7C26D9D}"/>
               </a:ext>
             </a:extLst>
           </p:cNvPr>
@@ -3700,7 +3701,15 @@
             </a:pPr>
             <a:r>
               <a:rPr lang="de-DE" dirty="0"/>
-              <a:t>    -&gt; Vorher: zwei kleinere Wanderungen zum näheren Kennenlernen und überwältigen von Schwierigkeiten</a:t>
+              <a:t>    -&gt; Vorher: zwei </a:t>
+            </a:r>
+            <a:r>
+              <a:rPr lang="de-DE" dirty="0" smtClean="0"/>
+              <a:t>kleinere </a:t>
+            </a:r>
+            <a:r>
+              <a:rPr lang="de-DE" dirty="0"/>
+              <a:t>Wanderungen zum näheren Kennenlernen und überwältigen von Schwierigkeiten</a:t>
             </a:r>
           </a:p>
           <a:p>
@@ -3782,7 +3791,7 @@
           <p:cNvPr id="2" name="Titel 1">
             <a:extLst>
               <a:ext uri="{FF2B5EF4-FFF2-40B4-BE49-F238E27FC236}">
-                <a16:creationId xmlns:a16="http://schemas.microsoft.com/office/drawing/2014/main" id="{4F739ADC-5906-4B3A-AE43-6D5BC5F4BD48}"/>
+                <a16:creationId xmlns:a16="http://schemas.microsoft.com/office/drawing/2014/main" xmlns="" id="{4F739ADC-5906-4B3A-AE43-6D5BC5F4BD48}"/>
               </a:ext>
             </a:extLst>
           </p:cNvPr>
@@ -3807,7 +3816,15 @@
             </a:br>
             <a:r>
               <a:rPr lang="de-DE" sz="1600" dirty="0"/>
-              <a:t>(Zusammenfassung der vorhandenen Meinungen)</a:t>
+              <a:t>(Zusammenfassung der </a:t>
+            </a:r>
+            <a:r>
+              <a:rPr lang="de-DE" sz="1600" dirty="0" smtClean="0"/>
+              <a:t>vorhandenen 7 von 10 </a:t>
+            </a:r>
+            <a:r>
+              <a:rPr lang="de-DE" sz="1600" dirty="0"/>
+              <a:t>Meinungen)</a:t>
             </a:r>
             <a:endParaRPr lang="de-DE" dirty="0"/>
           </a:p>
@@ -3818,7 +3835,7 @@
           <p:cNvPr id="3" name="Inhaltsplatzhalter 2">
             <a:extLst>
               <a:ext uri="{FF2B5EF4-FFF2-40B4-BE49-F238E27FC236}">
-                <a16:creationId xmlns:a16="http://schemas.microsoft.com/office/drawing/2014/main" id="{FAC06D36-63E7-45DD-8BCA-A263325C006C}"/>
+                <a16:creationId xmlns:a16="http://schemas.microsoft.com/office/drawing/2014/main" xmlns="" id="{FAC06D36-63E7-45DD-8BCA-A263325C006C}"/>
               </a:ext>
             </a:extLst>
           </p:cNvPr>
@@ -3831,8 +3848,8 @@
         </p:nvSpPr>
         <p:spPr>
           <a:xfrm>
-            <a:off x="838200" y="1825625"/>
-            <a:ext cx="10515600" cy="4437152"/>
+            <a:off x="901521" y="1596982"/>
+            <a:ext cx="10851524" cy="5009880"/>
           </a:xfrm>
         </p:spPr>
         <p:txBody>
@@ -3843,7 +3860,15 @@
           <a:p>
             <a:r>
               <a:rPr lang="de-DE" dirty="0"/>
-              <a:t>Wie hat die die Alpenwanderung gefallen?</a:t>
+              <a:t>Wie hat </a:t>
+            </a:r>
+            <a:r>
+              <a:rPr lang="de-DE" dirty="0" smtClean="0"/>
+              <a:t>dir </a:t>
+            </a:r>
+            <a:r>
+              <a:rPr lang="de-DE" dirty="0"/>
+              <a:t>die Alpenwanderung gefallen?</a:t>
             </a:r>
           </a:p>
           <a:p>
@@ -3852,7 +3877,11 @@
             </a:pPr>
             <a:r>
               <a:rPr lang="de-DE" dirty="0"/>
-              <a:t>   -&gt; Sehr gut         -&gt; Tolle und interessante Erfahrung</a:t>
+              <a:t>   -&gt; Sehr gut        </a:t>
+            </a:r>
+            <a:r>
+              <a:rPr lang="de-DE" dirty="0" smtClean="0"/>
+              <a:t>                                        </a:t>
             </a:r>
           </a:p>
           <a:p>
@@ -3860,9 +3889,44 @@
               <a:buNone/>
             </a:pPr>
             <a:r>
-              <a:rPr lang="de-DE" dirty="0"/>
-              <a:t>   -&gt; Kein Wiederholungsbedarf</a:t>
-            </a:r>
+              <a:rPr lang="de-DE" dirty="0" smtClean="0"/>
+              <a:t>   </a:t>
+            </a:r>
+            <a:r>
+              <a:rPr lang="de-DE" dirty="0"/>
+              <a:t>-&gt; Tolle und interessante Erfahrung</a:t>
+            </a:r>
+          </a:p>
+          <a:p>
+            <a:pPr marL="0" indent="0">
+              <a:buNone/>
+            </a:pPr>
+            <a:r>
+              <a:rPr lang="de-DE" dirty="0"/>
+              <a:t>   -&gt; Kein </a:t>
+            </a:r>
+            <a:r>
+              <a:rPr lang="de-DE" dirty="0" smtClean="0"/>
+              <a:t>Wiederholungsbedarf                </a:t>
+            </a:r>
+          </a:p>
+          <a:p>
+            <a:pPr marL="0" indent="0">
+              <a:buNone/>
+            </a:pPr>
+            <a:r>
+              <a:rPr lang="de-DE" dirty="0"/>
+              <a:t> </a:t>
+            </a:r>
+            <a:r>
+              <a:rPr lang="de-DE" dirty="0" smtClean="0"/>
+              <a:t>  </a:t>
+            </a:r>
+            <a:r>
+              <a:rPr lang="de-DE" dirty="0" smtClean="0"/>
+              <a:t>-&gt; Eindrucksvoll             </a:t>
+            </a:r>
+            <a:endParaRPr lang="de-DE" dirty="0"/>
           </a:p>
           <a:p>
             <a:pPr marL="0" indent="0">
@@ -3900,8 +3964,39 @@
             </a:pPr>
             <a:r>
               <a:rPr lang="de-DE" dirty="0"/>
-              <a:t>   -&gt; Es war eine Gemeinschaft die einfach gegeben war, damit kein richtiges gegenseitiges Helfen</a:t>
-            </a:r>
+              <a:t>   -&gt; Es war eine Gemeinschaft die einfach gegeben war, damit kein richtiges gegenseitiges </a:t>
+            </a:r>
+            <a:r>
+              <a:rPr lang="de-DE" dirty="0" smtClean="0"/>
+              <a:t>Unterstützen</a:t>
+            </a:r>
+          </a:p>
+          <a:p>
+            <a:pPr marL="0" indent="0">
+              <a:buNone/>
+            </a:pPr>
+            <a:r>
+              <a:rPr lang="de-DE" dirty="0"/>
+              <a:t> </a:t>
+            </a:r>
+            <a:r>
+              <a:rPr lang="de-DE" dirty="0" smtClean="0"/>
+              <a:t>  -&gt;  Anfangs schlechter als zum Ende hin</a:t>
+            </a:r>
+          </a:p>
+          <a:p>
+            <a:pPr marL="0" indent="0">
+              <a:buNone/>
+            </a:pPr>
+            <a:r>
+              <a:rPr lang="de-DE" dirty="0"/>
+              <a:t> </a:t>
+            </a:r>
+            <a:r>
+              <a:rPr lang="de-DE" dirty="0" smtClean="0"/>
+              <a:t>  -&gt; Gut </a:t>
+            </a:r>
+            <a:endParaRPr lang="de-DE" dirty="0"/>
           </a:p>
           <a:p>
             <a:pPr marL="0" indent="0">
@@ -3910,37 +4005,14 @@
             <a:endParaRPr lang="de-DE" dirty="0"/>
           </a:p>
           <a:p>
-            <a:r>
-              <a:rPr lang="de-DE" dirty="0"/>
-              <a:t>Gab es Komplikationen?</a:t>
-            </a:r>
-          </a:p>
-          <a:p>
             <a:pPr marL="0" indent="0">
               <a:buNone/>
             </a:pPr>
             <a:r>
-              <a:rPr lang="de-DE" dirty="0"/>
-              <a:t>   -&gt; Lustlosigkeit vieler Teilnehmer aufgrund der langen Etappen</a:t>
-            </a:r>
-          </a:p>
-          <a:p>
-            <a:pPr marL="0" indent="0">
-              <a:buNone/>
-            </a:pPr>
-            <a:r>
-              <a:rPr lang="de-DE" dirty="0"/>
-              <a:t>   -&gt; Organisation allgemein chaotisch und langwidrig</a:t>
-            </a:r>
-          </a:p>
-          <a:p>
-            <a:pPr marL="0" indent="0">
-              <a:buNone/>
-            </a:pPr>
-            <a:r>
-              <a:rPr lang="de-DE" dirty="0"/>
-              <a:t>   -&gt; Wandern wurde nur noch als Qual empfunden</a:t>
-            </a:r>
+              <a:rPr lang="de-DE" dirty="0" smtClean="0"/>
+              <a:t>  </a:t>
+            </a:r>
+            <a:endParaRPr lang="de-DE" dirty="0"/>
           </a:p>
           <a:p>
             <a:pPr marL="0" indent="0">
@@ -3985,7 +4057,7 @@
           <p:cNvPr id="2" name="Titel 1">
             <a:extLst>
               <a:ext uri="{FF2B5EF4-FFF2-40B4-BE49-F238E27FC236}">
-                <a16:creationId xmlns:a16="http://schemas.microsoft.com/office/drawing/2014/main" id="{74B8EBF3-C638-4E5E-A2BD-EBD5812B45FB}"/>
+                <a16:creationId xmlns:a16="http://schemas.microsoft.com/office/drawing/2014/main" xmlns="" id="{A09DD75F-CACC-4B34-A81F-C48F4709DA70}"/>
               </a:ext>
             </a:extLst>
           </p:cNvPr>
@@ -4033,7 +4105,7 @@
           <p:cNvPr id="3" name="Inhaltsplatzhalter 2">
             <a:extLst>
               <a:ext uri="{FF2B5EF4-FFF2-40B4-BE49-F238E27FC236}">
-                <a16:creationId xmlns:a16="http://schemas.microsoft.com/office/drawing/2014/main" id="{F7E57C12-D271-48FD-BBF7-E0E5B3D06E9F}"/>
+                <a16:creationId xmlns:a16="http://schemas.microsoft.com/office/drawing/2014/main" xmlns="" id="{C8A07777-9582-49BD-A1CB-23EF7A1DEF2B}"/>
               </a:ext>
             </a:extLst>
           </p:cNvPr>
@@ -4043,135 +4115,165 @@
           <p:nvPr>
             <p:ph idx="1"/>
           </p:nvPr>
+        </p:nvSpPr>
+        <p:spPr/>
+        <p:txBody>
+          <a:bodyPr/>
+          <a:lstStyle/>
+          <a:p>
+            <a:pPr marL="0" indent="0">
+              <a:buNone/>
+            </a:pPr>
+            <a:r>
+              <a:rPr lang="de-DE" dirty="0" smtClean="0"/>
+              <a:t>   </a:t>
+            </a:r>
+            <a:endParaRPr lang="de-DE" dirty="0"/>
+          </a:p>
+        </p:txBody>
+      </p:sp>
+      <p:sp>
+        <p:nvSpPr>
+          <p:cNvPr id="4" name="Rechteck 3"/>
+          <p:cNvSpPr/>
+          <p:nvPr/>
         </p:nvSpPr>
         <p:spPr>
           <a:xfrm>
-            <a:off x="586596" y="1690688"/>
-            <a:ext cx="11041812" cy="4891267"/>
+            <a:off x="669701" y="1997839"/>
+            <a:ext cx="10251584" cy="5632311"/>
           </a:xfrm>
+          <a:prstGeom prst="rect">
+            <a:avLst/>
+          </a:prstGeom>
         </p:spPr>
         <p:txBody>
-          <a:bodyPr>
-            <a:normAutofit fontScale="62500" lnSpcReduction="20000"/>
+          <a:bodyPr wrap="square">
+            <a:spAutoFit/>
           </a:bodyPr>
           <a:lstStyle/>
           <a:p>
-            <a:r>
-              <a:rPr lang="de-DE" dirty="0"/>
-              <a:t>Gab es deiner Meinung nach eine Entwicklung / Verbesserung zwischen den beiden kleineren Wanderungen und der Studienfahrt?</a:t>
-            </a:r>
-          </a:p>
-          <a:p>
-            <a:pPr marL="0" indent="0">
-              <a:buNone/>
+            <a:pPr marL="285750" indent="-285750">
+              <a:buFont typeface="Arial" pitchFamily="34" charset="0"/>
+              <a:buChar char="•"/>
             </a:pPr>
             <a:r>
               <a:rPr lang="de-DE" dirty="0"/>
-              <a:t>   -&gt; Probewanderungen waren kein guter Vergleich, da sie viel kürzer waren</a:t>
-            </a:r>
-          </a:p>
-          <a:p>
-            <a:pPr marL="0" indent="0">
-              <a:buNone/>
-            </a:pPr>
-            <a:r>
-              <a:rPr lang="de-DE" dirty="0"/>
-              <a:t>   -&gt; Keine richtige Einschätzungsmöglichkeit</a:t>
-            </a:r>
-          </a:p>
-          <a:p>
-            <a:pPr marL="0" indent="0">
-              <a:buNone/>
-            </a:pPr>
-            <a:r>
-              <a:rPr lang="de-DE" dirty="0"/>
-              <a:t>   -&gt; Mehr fehlende Motivation</a:t>
-            </a:r>
-          </a:p>
-          <a:p>
-            <a:pPr marL="0" indent="0">
-              <a:buNone/>
-            </a:pPr>
-            <a:r>
-              <a:rPr lang="de-DE" dirty="0"/>
-              <a:t>   -&gt; Nicht so häufiges Verlaufen in der Studienfahrt </a:t>
-            </a:r>
-          </a:p>
-          <a:p>
-            <a:pPr marL="0" indent="0">
-              <a:buNone/>
-            </a:pPr>
+              <a:t>Gab es Komplikationen?</a:t>
+            </a:r>
+          </a:p>
+          <a:p>
+            <a:r>
+              <a:rPr lang="de-DE" dirty="0"/>
+              <a:t>   -&gt; Lustlosigkeit vieler Teilnehmer aufgrund der langen Etappen</a:t>
+            </a:r>
+          </a:p>
+          <a:p>
+            <a:r>
+              <a:rPr lang="de-DE" dirty="0"/>
+              <a:t>   -&gt; Organisation allgemein chaotisch und langwidrig (z.B. längere Routen als geplant)</a:t>
+            </a:r>
+          </a:p>
+          <a:p>
+            <a:r>
+              <a:rPr lang="de-DE" dirty="0"/>
+              <a:t>   -&gt; Wandern wurde nur noch als Qual empfunden        </a:t>
+            </a:r>
+          </a:p>
+          <a:p>
+            <a:r>
+              <a:rPr lang="de-DE" dirty="0"/>
+              <a:t>   -&gt; Einige wurden krank</a:t>
+            </a:r>
+          </a:p>
+          <a:p>
+            <a:r>
+              <a:rPr lang="de-DE" dirty="0"/>
+              <a:t>   -&gt; zu langes / zu kurzes warten bei den Pausen und kein Durchgreifen </a:t>
+            </a:r>
+            <a:r>
+              <a:rPr lang="de-DE" dirty="0" smtClean="0"/>
+              <a:t>diesbezüglich</a:t>
+            </a:r>
+          </a:p>
+          <a:p>
+            <a:r>
+              <a:rPr lang="de-DE" dirty="0"/>
+              <a:t> </a:t>
+            </a:r>
+            <a:r>
+              <a:rPr lang="de-DE" dirty="0" smtClean="0"/>
+              <a:t>  -&gt; nicht sehr ansprechendes Essen / Unterkünfte</a:t>
+            </a:r>
+          </a:p>
+          <a:p>
+            <a:r>
+              <a:rPr lang="de-DE" dirty="0"/>
+              <a:t> </a:t>
+            </a:r>
+            <a:r>
+              <a:rPr lang="de-DE" dirty="0" smtClean="0"/>
+              <a:t>  -&gt; schlechte Planung</a:t>
+            </a:r>
+          </a:p>
+          <a:p>
+            <a:r>
+              <a:rPr lang="de-DE" dirty="0"/>
+              <a:t> </a:t>
+            </a:r>
+            <a:r>
+              <a:rPr lang="de-DE" dirty="0" smtClean="0"/>
+              <a:t>  -&gt; fehlendes Interesse </a:t>
+            </a:r>
+            <a:r>
+              <a:rPr lang="de-DE" smtClean="0"/>
+              <a:t>am Projekt</a:t>
+            </a:r>
+            <a:endParaRPr lang="de-DE" dirty="0" smtClean="0"/>
+          </a:p>
+          <a:p>
+            <a:endParaRPr lang="de-DE" dirty="0" smtClean="0"/>
+          </a:p>
+          <a:p>
             <a:endParaRPr lang="de-DE" dirty="0"/>
           </a:p>
           <a:p>
-            <a:r>
-              <a:rPr lang="de-DE" dirty="0"/>
-              <a:t>Was wurde während dem Wandern unternommen (Entertainment)?</a:t>
-            </a:r>
-          </a:p>
-          <a:p>
-            <a:pPr marL="0" indent="0">
-              <a:buNone/>
-            </a:pPr>
-            <a:r>
-              <a:rPr lang="de-DE" dirty="0"/>
-              <a:t>   -&gt;Unterhaltungen über Umgebung, Tiere und allgemeines</a:t>
-            </a:r>
-          </a:p>
-          <a:p>
-            <a:pPr marL="0" indent="0">
-              <a:buNone/>
-            </a:pPr>
-            <a:r>
-              <a:rPr lang="de-DE" dirty="0"/>
-              <a:t>   -&gt; Musik</a:t>
-            </a:r>
-          </a:p>
-          <a:p>
-            <a:pPr marL="0" indent="0">
-              <a:buNone/>
-            </a:pPr>
+            <a:endParaRPr lang="de-DE" dirty="0" smtClean="0"/>
+          </a:p>
+          <a:p>
             <a:endParaRPr lang="de-DE" dirty="0"/>
           </a:p>
           <a:p>
-            <a:r>
-              <a:rPr lang="de-DE" dirty="0"/>
-              <a:t>Hast du Verbesserungsvorschläge?</a:t>
-            </a:r>
-          </a:p>
-          <a:p>
-            <a:pPr marL="0" indent="0">
-              <a:buNone/>
-            </a:pPr>
-            <a:r>
-              <a:rPr lang="de-DE" dirty="0"/>
-              <a:t>  -&gt; Besserer Zusammenhalt der Gruppe </a:t>
-            </a:r>
-          </a:p>
-          <a:p>
-            <a:pPr marL="0" indent="0">
-              <a:buNone/>
-            </a:pPr>
-            <a:r>
-              <a:rPr lang="de-DE" dirty="0"/>
-              <a:t>  -&gt; Kompromiss über gemeinsame Laufgeschwindigkeit</a:t>
-            </a:r>
-          </a:p>
-          <a:p>
-            <a:pPr marL="0" indent="0">
-              <a:buNone/>
-            </a:pPr>
-            <a:r>
-              <a:rPr lang="de-DE" dirty="0"/>
-              <a:t>  -&gt; Wählen von kürzeren Etappen</a:t>
-            </a:r>
+            <a:endParaRPr lang="de-DE" dirty="0" smtClean="0"/>
+          </a:p>
+          <a:p>
+            <a:endParaRPr lang="de-DE" dirty="0"/>
+          </a:p>
+          <a:p>
+            <a:endParaRPr lang="de-DE" dirty="0" smtClean="0"/>
+          </a:p>
+          <a:p>
+            <a:endParaRPr lang="de-DE" dirty="0"/>
+          </a:p>
+          <a:p>
+            <a:endParaRPr lang="de-DE" dirty="0" smtClean="0"/>
+          </a:p>
+          <a:p>
+            <a:endParaRPr lang="de-DE" dirty="0"/>
+          </a:p>
+          <a:p>
+            <a:r>
+              <a:rPr lang="de-DE" dirty="0"/>
+              <a:t>  </a:t>
+            </a:r>
+            <a:endParaRPr lang="de-DE" dirty="0"/>
           </a:p>
         </p:txBody>
       </p:sp>
     </p:spTree>
     <p:extLst>
       <p:ext uri="{BB962C8B-B14F-4D97-AF65-F5344CB8AC3E}">
-        <p14:creationId xmlns:p14="http://schemas.microsoft.com/office/powerpoint/2010/main" val="1245892461"/>
+        <p14:creationId xmlns:p14="http://schemas.microsoft.com/office/powerpoint/2010/main" val="939752285"/>
       </p:ext>
     </p:extLst>
   </p:cSld>
@@ -4203,7 +4305,7 @@
           <p:cNvPr id="2" name="Titel 1">
             <a:extLst>
               <a:ext uri="{FF2B5EF4-FFF2-40B4-BE49-F238E27FC236}">
-                <a16:creationId xmlns:a16="http://schemas.microsoft.com/office/drawing/2014/main" id="{A09DD75F-CACC-4B34-A81F-C48F4709DA70}"/>
+                <a16:creationId xmlns:a16="http://schemas.microsoft.com/office/drawing/2014/main" xmlns="" id="{74B8EBF3-C638-4E5E-A2BD-EBD5812B45FB}"/>
               </a:ext>
             </a:extLst>
           </p:cNvPr>
@@ -4251,7 +4353,7 @@
           <p:cNvPr id="3" name="Inhaltsplatzhalter 2">
             <a:extLst>
               <a:ext uri="{FF2B5EF4-FFF2-40B4-BE49-F238E27FC236}">
-                <a16:creationId xmlns:a16="http://schemas.microsoft.com/office/drawing/2014/main" id="{C8A07777-9582-49BD-A1CB-23EF7A1DEF2B}"/>
+                <a16:creationId xmlns:a16="http://schemas.microsoft.com/office/drawing/2014/main" xmlns="" id="{F7E57C12-D271-48FD-BBF7-E0E5B3D06E9F}"/>
               </a:ext>
             </a:extLst>
           </p:cNvPr>
@@ -4262,14 +4364,21 @@
             <p:ph idx="1"/>
           </p:nvPr>
         </p:nvSpPr>
-        <p:spPr/>
-        <p:txBody>
-          <a:bodyPr/>
-          <a:lstStyle/>
-          <a:p>
-            <a:r>
-              <a:rPr lang="de-DE" dirty="0"/>
-              <a:t>Kennst du die anderen und dich selber besser durch die Wanderung?</a:t>
+        <p:spPr>
+          <a:xfrm>
+            <a:off x="586596" y="1690688"/>
+            <a:ext cx="11041812" cy="4891267"/>
+          </a:xfrm>
+        </p:spPr>
+        <p:txBody>
+          <a:bodyPr>
+            <a:normAutofit fontScale="62500" lnSpcReduction="20000"/>
+          </a:bodyPr>
+          <a:lstStyle/>
+          <a:p>
+            <a:r>
+              <a:rPr lang="de-DE" dirty="0"/>
+              <a:t>Gab es deiner Meinung nach eine Entwicklung / Verbesserung zwischen den beiden kleineren Wanderungen und der Studienfahrt?</a:t>
             </a:r>
           </a:p>
           <a:p>
@@ -4278,15 +4387,392 @@
             </a:pPr>
             <a:r>
               <a:rPr lang="de-DE" dirty="0"/>
-              <a:t>   -&gt; Ja, bisschen</a:t>
-            </a:r>
+              <a:t>   -&gt; Probewanderungen waren kein guter Vergleich, da sie viel kürzer waren</a:t>
+            </a:r>
+          </a:p>
+          <a:p>
+            <a:pPr marL="0" indent="0">
+              <a:buNone/>
+            </a:pPr>
+            <a:r>
+              <a:rPr lang="de-DE" dirty="0"/>
+              <a:t>   -&gt; Keine richtige Einschätzungsmöglichkeit</a:t>
+            </a:r>
+          </a:p>
+          <a:p>
+            <a:pPr marL="0" indent="0">
+              <a:buNone/>
+            </a:pPr>
+            <a:r>
+              <a:rPr lang="de-DE" dirty="0"/>
+              <a:t>   -&gt; Mehr fehlende Motivation</a:t>
+            </a:r>
+          </a:p>
+          <a:p>
+            <a:pPr marL="0" indent="0">
+              <a:buNone/>
+            </a:pPr>
+            <a:r>
+              <a:rPr lang="de-DE" dirty="0"/>
+              <a:t>   -&gt; Nicht so häufiges Verlaufen in der Studienfahrt </a:t>
+            </a:r>
+            <a:endParaRPr lang="de-DE" dirty="0" smtClean="0"/>
+          </a:p>
+          <a:p>
+            <a:pPr marL="0" indent="0">
+              <a:buNone/>
+            </a:pPr>
+            <a:r>
+              <a:rPr lang="de-DE" dirty="0" smtClean="0"/>
+              <a:t>   -&gt; Mehr Achtsamkeit , besseres Beieinander bleiben, mehr Pausen</a:t>
+            </a:r>
+          </a:p>
+          <a:p>
+            <a:pPr marL="0" indent="0">
+              <a:buNone/>
+            </a:pPr>
+            <a:r>
+              <a:rPr lang="de-DE" dirty="0" smtClean="0"/>
+              <a:t>   -&gt; Abkürzungen mit dem Bus (gut)</a:t>
+            </a:r>
+          </a:p>
+          <a:p>
+            <a:pPr marL="0" indent="0">
+              <a:buNone/>
+            </a:pPr>
+            <a:r>
+              <a:rPr lang="de-DE" dirty="0"/>
+              <a:t> </a:t>
+            </a:r>
+            <a:r>
+              <a:rPr lang="de-DE" dirty="0" smtClean="0"/>
+              <a:t>  -&gt; Kennenlernen der weiteren Teilnehmer</a:t>
+            </a:r>
+            <a:endParaRPr lang="de-DE" dirty="0"/>
+          </a:p>
+          <a:p>
+            <a:pPr marL="0" indent="0">
+              <a:buNone/>
+            </a:pPr>
+            <a:endParaRPr lang="de-DE" dirty="0"/>
+          </a:p>
+          <a:p>
+            <a:r>
+              <a:rPr lang="de-DE" dirty="0"/>
+              <a:t>Was wurde während dem Wandern unternommen (Entertainment)?</a:t>
+            </a:r>
+          </a:p>
+          <a:p>
+            <a:pPr marL="0" indent="0">
+              <a:buNone/>
+            </a:pPr>
+            <a:r>
+              <a:rPr lang="de-DE" dirty="0"/>
+              <a:t>   -&gt;Unterhaltungen über Umgebung, Tiere </a:t>
+            </a:r>
+            <a:r>
+              <a:rPr lang="de-DE" dirty="0" smtClean="0"/>
+              <a:t>, </a:t>
+            </a:r>
+            <a:r>
+              <a:rPr lang="de-DE" dirty="0" smtClean="0"/>
+              <a:t>geschichtspolitische und geografische Fakten</a:t>
+            </a:r>
+            <a:endParaRPr lang="de-DE" dirty="0"/>
+          </a:p>
+          <a:p>
+            <a:pPr marL="0" indent="0">
+              <a:buNone/>
+            </a:pPr>
+            <a:r>
+              <a:rPr lang="de-DE" dirty="0"/>
+              <a:t>   -&gt; </a:t>
+            </a:r>
+            <a:r>
+              <a:rPr lang="de-DE" dirty="0" smtClean="0"/>
+              <a:t>Musik, Karten spielen</a:t>
+            </a:r>
+          </a:p>
+          <a:p>
+            <a:pPr marL="0" indent="0">
+              <a:buNone/>
+            </a:pPr>
+            <a:r>
+              <a:rPr lang="de-DE" dirty="0"/>
+              <a:t> </a:t>
+            </a:r>
+            <a:r>
+              <a:rPr lang="de-DE" dirty="0" smtClean="0"/>
+              <a:t>  -&gt; Steigerung der Moral mit Witzen</a:t>
+            </a:r>
+          </a:p>
+          <a:p>
+            <a:pPr marL="0" indent="0">
+              <a:buNone/>
+            </a:pPr>
+            <a:r>
+              <a:rPr lang="de-DE" dirty="0"/>
+              <a:t> </a:t>
+            </a:r>
+            <a:r>
+              <a:rPr lang="de-DE" dirty="0" smtClean="0"/>
+              <a:t>  -&gt; Betrachten des </a:t>
+            </a:r>
+            <a:r>
+              <a:rPr lang="de-DE" dirty="0" err="1" smtClean="0"/>
+              <a:t>Sonnenauf</a:t>
+            </a:r>
+            <a:r>
+              <a:rPr lang="de-DE" dirty="0" smtClean="0"/>
+              <a:t>- und -untergangs</a:t>
+            </a:r>
+            <a:endParaRPr lang="de-DE" dirty="0"/>
+          </a:p>
+          <a:p>
+            <a:pPr marL="0" indent="0">
+              <a:buNone/>
+            </a:pPr>
+            <a:endParaRPr lang="de-DE" dirty="0"/>
+          </a:p>
+          <a:p>
+            <a:pPr marL="0" indent="0">
+              <a:buNone/>
+            </a:pPr>
+            <a:endParaRPr lang="de-DE" dirty="0"/>
           </a:p>
         </p:txBody>
       </p:sp>
     </p:spTree>
     <p:extLst>
       <p:ext uri="{BB962C8B-B14F-4D97-AF65-F5344CB8AC3E}">
-        <p14:creationId xmlns:p14="http://schemas.microsoft.com/office/powerpoint/2010/main" val="939752285"/>
+        <p14:creationId xmlns:p14="http://schemas.microsoft.com/office/powerpoint/2010/main" val="1245892461"/>
+      </p:ext>
+    </p:extLst>
+  </p:cSld>
+  <p:clrMapOvr>
+    <a:masterClrMapping/>
+  </p:clrMapOvr>
+</p:sld>
+</file>
+
+<file path=ppt/slides/slide7.xml><?xml version="1.0" encoding="utf-8"?>
+<p:sld xmlns:a="http://schemas.openxmlformats.org/drawingml/2006/main" xmlns:r="http://schemas.openxmlformats.org/officeDocument/2006/relationships" xmlns:p="http://schemas.openxmlformats.org/presentationml/2006/main">
+  <p:cSld>
+    <p:spTree>
+      <p:nvGrpSpPr>
+        <p:cNvPr id="1" name=""/>
+        <p:cNvGrpSpPr/>
+        <p:nvPr/>
+      </p:nvGrpSpPr>
+      <p:grpSpPr>
+        <a:xfrm>
+          <a:off x="0" y="0"/>
+          <a:ext cx="0" cy="0"/>
+          <a:chOff x="0" y="0"/>
+          <a:chExt cx="0" cy="0"/>
+        </a:xfrm>
+      </p:grpSpPr>
+      <p:sp>
+        <p:nvSpPr>
+          <p:cNvPr id="2" name="Titel 1"/>
+          <p:cNvSpPr>
+            <a:spLocks noGrp="1"/>
+          </p:cNvSpPr>
+          <p:nvPr>
+            <p:ph type="title"/>
+          </p:nvPr>
+        </p:nvSpPr>
+        <p:spPr/>
+        <p:txBody>
+          <a:bodyPr/>
+          <a:lstStyle/>
+          <a:p>
+            <a:r>
+              <a:rPr lang="de-DE" dirty="0">
+                <a:solidFill>
+                  <a:prstClr val="black"/>
+                </a:solidFill>
+              </a:rPr>
+              <a:t>Auswertung der Umfrage unserer Teilnehmer</a:t>
+            </a:r>
+            <a:br>
+              <a:rPr lang="de-DE" dirty="0">
+                <a:solidFill>
+                  <a:prstClr val="black"/>
+                </a:solidFill>
+              </a:rPr>
+            </a:br>
+            <a:r>
+              <a:rPr lang="de-DE" sz="1600" dirty="0">
+                <a:solidFill>
+                  <a:prstClr val="black"/>
+                </a:solidFill>
+              </a:rPr>
+              <a:t>(Zusammenfassung der vorhandenen Meinungen)</a:t>
+            </a:r>
+            <a:endParaRPr lang="de-DE" dirty="0"/>
+          </a:p>
+        </p:txBody>
+      </p:sp>
+      <p:sp>
+        <p:nvSpPr>
+          <p:cNvPr id="3" name="Inhaltsplatzhalter 2"/>
+          <p:cNvSpPr>
+            <a:spLocks noGrp="1"/>
+          </p:cNvSpPr>
+          <p:nvPr>
+            <p:ph idx="1"/>
+          </p:nvPr>
+        </p:nvSpPr>
+        <p:spPr/>
+        <p:txBody>
+          <a:bodyPr>
+            <a:normAutofit fontScale="70000" lnSpcReduction="20000"/>
+          </a:bodyPr>
+          <a:lstStyle/>
+          <a:p>
+            <a:r>
+              <a:rPr lang="de-DE" dirty="0"/>
+              <a:t>Hast du Verbesserungsvorschläge?</a:t>
+            </a:r>
+          </a:p>
+          <a:p>
+            <a:pPr marL="0" indent="0">
+              <a:buNone/>
+            </a:pPr>
+            <a:r>
+              <a:rPr lang="de-DE" dirty="0"/>
+              <a:t>  -&gt; Besserer Zusammenhalt der Gruppe </a:t>
+            </a:r>
+          </a:p>
+          <a:p>
+            <a:pPr marL="0" indent="0">
+              <a:buNone/>
+            </a:pPr>
+            <a:r>
+              <a:rPr lang="de-DE" dirty="0"/>
+              <a:t>  -&gt; Kompromiss über gemeinsame Laufgeschwindigkeit</a:t>
+            </a:r>
+          </a:p>
+          <a:p>
+            <a:pPr marL="0" indent="0">
+              <a:buNone/>
+            </a:pPr>
+            <a:r>
+              <a:rPr lang="de-DE" dirty="0"/>
+              <a:t>  -&gt; Wählen von kürzeren Etappen  beziehungsweise genaueres recherchieren über die Kilometeranzahl der Wege</a:t>
+            </a:r>
+          </a:p>
+          <a:p>
+            <a:pPr marL="0" indent="0">
+              <a:buNone/>
+            </a:pPr>
+            <a:r>
+              <a:rPr lang="de-DE" dirty="0"/>
+              <a:t>  -&gt; Alle Teilnehmer sollten sich des Projekts bewusst sein und auch nur dann </a:t>
+            </a:r>
+            <a:r>
+              <a:rPr lang="de-DE" dirty="0" smtClean="0"/>
+              <a:t>mitkommen</a:t>
+            </a:r>
+          </a:p>
+          <a:p>
+            <a:pPr marL="0" indent="0">
+              <a:buNone/>
+            </a:pPr>
+            <a:r>
+              <a:rPr lang="de-DE" dirty="0" smtClean="0"/>
+              <a:t>  -&gt; keine Sticheleien untereinander</a:t>
+            </a:r>
+          </a:p>
+          <a:p>
+            <a:pPr marL="0" indent="0">
+              <a:buNone/>
+            </a:pPr>
+            <a:endParaRPr lang="de-DE" dirty="0"/>
+          </a:p>
+          <a:p>
+            <a:r>
+              <a:rPr lang="de-DE" dirty="0"/>
+              <a:t>Kennst du die anderen und dich selber besser durch die Wanderung?</a:t>
+            </a:r>
+          </a:p>
+          <a:p>
+            <a:pPr marL="0" indent="0">
+              <a:buNone/>
+            </a:pPr>
+            <a:r>
+              <a:rPr lang="de-DE" dirty="0"/>
+              <a:t>  </a:t>
+            </a:r>
+            <a:r>
+              <a:rPr lang="de-DE" dirty="0" smtClean="0"/>
+              <a:t>-&gt; Ja</a:t>
+            </a:r>
+            <a:endParaRPr lang="de-DE" dirty="0"/>
+          </a:p>
+          <a:p>
+            <a:pPr marL="0" indent="0">
+              <a:buNone/>
+            </a:pPr>
+            <a:r>
+              <a:rPr lang="de-DE" dirty="0"/>
+              <a:t>  </a:t>
+            </a:r>
+            <a:r>
+              <a:rPr lang="de-DE" dirty="0" smtClean="0"/>
+              <a:t>-&gt; </a:t>
+            </a:r>
+            <a:r>
+              <a:rPr lang="de-DE" dirty="0"/>
+              <a:t>Nur die Leute mit der gleichen </a:t>
+            </a:r>
+            <a:r>
+              <a:rPr lang="de-DE" dirty="0" smtClean="0"/>
+              <a:t>Laufgeschwindigkeit</a:t>
+            </a:r>
+          </a:p>
+          <a:p>
+            <a:pPr marL="0" indent="0">
+              <a:buNone/>
+            </a:pPr>
+            <a:r>
+              <a:rPr lang="de-DE" dirty="0"/>
+              <a:t> </a:t>
+            </a:r>
+            <a:r>
+              <a:rPr lang="de-DE" dirty="0" smtClean="0"/>
+              <a:t> -&gt; Nein, nicht ausschlaggebend</a:t>
+            </a:r>
+          </a:p>
+          <a:p>
+            <a:pPr marL="0" indent="0">
+              <a:buNone/>
+            </a:pPr>
+            <a:r>
+              <a:rPr lang="de-DE" dirty="0"/>
+              <a:t> </a:t>
+            </a:r>
+            <a:r>
+              <a:rPr lang="de-DE" dirty="0" smtClean="0"/>
+              <a:t> -&gt; Bessere Selbstkenntnis durch testen der persönlichen Grenzen</a:t>
+            </a:r>
+          </a:p>
+          <a:p>
+            <a:pPr marL="0" indent="0">
+              <a:buNone/>
+            </a:pPr>
+            <a:endParaRPr lang="de-DE" dirty="0"/>
+          </a:p>
+          <a:p>
+            <a:endParaRPr lang="de-DE" dirty="0"/>
+          </a:p>
+        </p:txBody>
+      </p:sp>
+    </p:spTree>
+    <p:extLst>
+      <p:ext uri="{BB962C8B-B14F-4D97-AF65-F5344CB8AC3E}">
+        <p14:creationId xmlns:p14="http://schemas.microsoft.com/office/powerpoint/2010/main" val="1315480435"/>
       </p:ext>
     </p:extLst>
   </p:cSld>
@@ -4339,7 +4825,7 @@
     </a:clrScheme>
     <a:fontScheme name="Office">
       <a:majorFont>
-        <a:latin typeface="Calibri Light" panose="020F0302020204030204"/>
+        <a:latin typeface="Calibri Light"/>
         <a:ea typeface=""/>
         <a:cs typeface=""/>
         <a:font script="Jpan" typeface="游ゴシック Light"/>
@@ -4391,7 +4877,7 @@
         <a:font script="Tfng" typeface="Ebrima"/>
       </a:majorFont>
       <a:minorFont>
-        <a:latin typeface="Calibri" panose="020F0502020204030204"/>
+        <a:latin typeface="Calibri"/>
         <a:ea typeface=""/>
         <a:cs typeface=""/>
         <a:font script="Jpan" typeface="游ゴシック"/>
@@ -4585,7 +5071,7 @@
   <a:extraClrSchemeLst/>
   <a:extLst>
     <a:ext uri="{05A4C25C-085E-4340-85A3-A5531E510DB2}">
-      <thm15:themeFamily xmlns:thm15="http://schemas.microsoft.com/office/thememl/2012/main" name="Office Theme" id="{62F939B6-93AF-4DB8-9C6B-D6C7DFDC589F}" vid="{4A3C46E8-61CC-4603-A589-7422A47A8E4A}"/>
+      <thm15:themeFamily xmlns:thm15="http://schemas.microsoft.com/office/thememl/2012/main" xmlns="" name="Office Theme" id="{62F939B6-93AF-4DB8-9C6B-D6C7DFDC589F}" vid="{4A3C46E8-61CC-4603-A589-7422A47A8E4A}"/>
     </a:ext>
   </a:extLst>
 </a:theme>

</xml_diff>